<commit_message>
share and framework data update
</commit_message>
<xml_diff>
--- a/debug/ANR原理简介.pptx
+++ b/debug/ANR原理简介.pptx
@@ -5,28 +5,29 @@
     <p:sldMasterId id="2147483648" r:id="rId1"/>
   </p:sldMasterIdLst>
   <p:notesMasterIdLst>
-    <p:notesMasterId r:id="rId5"/>
+    <p:notesMasterId r:id="rId22"/>
   </p:notesMasterIdLst>
   <p:sldIdLst>
-    <p:sldId id="256" r:id="rId3"/>
-    <p:sldId id="257" r:id="rId4"/>
-    <p:sldId id="270" r:id="rId6"/>
-    <p:sldId id="289" r:id="rId7"/>
-    <p:sldId id="290" r:id="rId8"/>
-    <p:sldId id="278" r:id="rId9"/>
-    <p:sldId id="262" r:id="rId10"/>
-    <p:sldId id="258" r:id="rId11"/>
-    <p:sldId id="277" r:id="rId12"/>
-    <p:sldId id="259" r:id="rId13"/>
-    <p:sldId id="260" r:id="rId14"/>
-    <p:sldId id="261" r:id="rId15"/>
-    <p:sldId id="291" r:id="rId16"/>
-    <p:sldId id="292" r:id="rId17"/>
-    <p:sldId id="271" r:id="rId18"/>
-    <p:sldId id="265" r:id="rId19"/>
-    <p:sldId id="268" r:id="rId20"/>
-    <p:sldId id="263" r:id="rId21"/>
-    <p:sldId id="275" r:id="rId22"/>
+    <p:sldId id="256" r:id="rId2"/>
+    <p:sldId id="257" r:id="rId3"/>
+    <p:sldId id="270" r:id="rId4"/>
+    <p:sldId id="289" r:id="rId5"/>
+    <p:sldId id="290" r:id="rId6"/>
+    <p:sldId id="278" r:id="rId7"/>
+    <p:sldId id="262" r:id="rId8"/>
+    <p:sldId id="258" r:id="rId9"/>
+    <p:sldId id="277" r:id="rId10"/>
+    <p:sldId id="259" r:id="rId11"/>
+    <p:sldId id="260" r:id="rId12"/>
+    <p:sldId id="261" r:id="rId13"/>
+    <p:sldId id="291" r:id="rId14"/>
+    <p:sldId id="292" r:id="rId15"/>
+    <p:sldId id="271" r:id="rId16"/>
+    <p:sldId id="265" r:id="rId17"/>
+    <p:sldId id="268" r:id="rId18"/>
+    <p:sldId id="263" r:id="rId19"/>
+    <p:sldId id="294" r:id="rId20"/>
+    <p:sldId id="275" r:id="rId21"/>
   </p:sldIdLst>
   <p:sldSz cx="12192000" cy="6858000"/>
   <p:notesSz cx="6858000" cy="9144000"/>
@@ -125,6 +126,11 @@
       </a:defRPr>
     </a:lvl9pPr>
   </p:defaultTextStyle>
+  <p:extLst>
+    <p:ext uri="{EFAFB233-063F-42B5-8137-9DF3F51BA10A}">
+      <p15:sldGuideLst xmlns:p15="http://schemas.microsoft.com/office/powerpoint/2012/main"/>
+    </p:ext>
+  </p:extLst>
 </p:presentation>
 </file>
 
@@ -210,6 +216,7 @@
           <a:p>
             <a:fld id="{D2A48B96-639E-45A3-A0BA-2464DFDB1FAA}" type="datetimeFigureOut">
               <a:rPr lang="zh-CN" altLang="en-US" smtClean="0"/>
+              <a:t>2018/9/28</a:t>
             </a:fld>
             <a:endParaRPr lang="zh-CN" altLang="en-US"/>
           </a:p>
@@ -276,7 +283,6 @@
               <a:rPr lang="zh-CN" altLang="en-US" smtClean="0"/>
               <a:t>单击此处编辑母版文本样式</a:t>
             </a:r>
-            <a:endParaRPr lang="zh-CN" altLang="en-US" smtClean="0"/>
           </a:p>
           <a:p>
             <a:pPr lvl="1"/>
@@ -284,7 +290,6 @@
               <a:rPr lang="zh-CN" altLang="en-US" smtClean="0"/>
               <a:t>第二级</a:t>
             </a:r>
-            <a:endParaRPr lang="zh-CN" altLang="en-US" smtClean="0"/>
           </a:p>
           <a:p>
             <a:pPr lvl="2"/>
@@ -292,7 +297,6 @@
               <a:rPr lang="zh-CN" altLang="en-US" smtClean="0"/>
               <a:t>第三级</a:t>
             </a:r>
-            <a:endParaRPr lang="zh-CN" altLang="en-US" smtClean="0"/>
           </a:p>
           <a:p>
             <a:pPr lvl="3"/>
@@ -300,7 +304,6 @@
               <a:rPr lang="zh-CN" altLang="en-US" smtClean="0"/>
               <a:t>第四级</a:t>
             </a:r>
-            <a:endParaRPr lang="zh-CN" altLang="en-US" smtClean="0"/>
           </a:p>
           <a:p>
             <a:pPr lvl="4"/>
@@ -372,12 +375,18 @@
           <a:p>
             <a:fld id="{A6837353-30EB-4A48-80EB-173D804AEFBD}" type="slidenum">
               <a:rPr lang="zh-CN" altLang="en-US" smtClean="0"/>
+              <a:t>‹#›</a:t>
             </a:fld>
             <a:endParaRPr lang="zh-CN" altLang="en-US"/>
           </a:p>
         </p:txBody>
       </p:sp>
     </p:spTree>
+    <p:extLst>
+      <p:ext uri="{BB962C8B-B14F-4D97-AF65-F5344CB8AC3E}">
+        <p14:creationId xmlns:p14="http://schemas.microsoft.com/office/powerpoint/2010/main" val="1066879943"/>
+      </p:ext>
+    </p:extLst>
   </p:cSld>
   <p:clrMap bg1="lt1" tx1="dk1" bg2="lt2" tx2="dk2" accent1="accent1" accent2="accent2" accent3="accent3" accent4="accent4" accent5="accent5" accent6="accent6" hlink="hlink" folHlink="folHlink"/>
   <p:notesStyle>
@@ -484,11 +493,20 @@
         <p:cNvGrpSpPr/>
         <p:nvPr/>
       </p:nvGrpSpPr>
-      <p:grpSpPr/>
+      <p:grpSpPr>
+        <a:xfrm>
+          <a:off x="0" y="0"/>
+          <a:ext cx="0" cy="0"/>
+          <a:chOff x="0" y="0"/>
+          <a:chExt cx="0" cy="0"/>
+        </a:xfrm>
+      </p:grpSpPr>
       <p:sp>
         <p:nvSpPr>
           <p:cNvPr id="2" name="幻灯片图像占位符 1"/>
-          <p:cNvSpPr/>
+          <p:cNvSpPr>
+            <a:spLocks noGrp="1" noRot="1" noChangeAspect="1"/>
+          </p:cNvSpPr>
           <p:nvPr>
             <p:ph type="sldImg" idx="2"/>
           </p:nvPr>
@@ -498,7 +516,9 @@
       <p:sp>
         <p:nvSpPr>
           <p:cNvPr id="3" name="文本占位符 2"/>
-          <p:cNvSpPr/>
+          <p:cNvSpPr>
+            <a:spLocks noGrp="1"/>
+          </p:cNvSpPr>
           <p:nvPr>
             <p:ph type="body" idx="3"/>
           </p:nvPr>
@@ -506,12 +526,18 @@
         <p:spPr/>
         <p:txBody>
           <a:bodyPr/>
+          <a:lstStyle/>
           <a:p>
             <a:endParaRPr lang="zh-CN" altLang="en-US"/>
           </a:p>
         </p:txBody>
       </p:sp>
     </p:spTree>
+    <p:extLst>
+      <p:ext uri="{BB962C8B-B14F-4D97-AF65-F5344CB8AC3E}">
+        <p14:creationId xmlns:p14="http://schemas.microsoft.com/office/powerpoint/2010/main" val="3552249984"/>
+      </p:ext>
+    </p:extLst>
   </p:cSld>
   <p:clrMapOvr>
     <a:masterClrMapping/>
@@ -520,7 +546,7 @@
 </file>
 
 <file path=ppt/slideLayouts/slideLayout1.xml><?xml version="1.0" encoding="utf-8"?>
-<p:sldLayout xmlns:a="http://schemas.openxmlformats.org/drawingml/2006/main" xmlns:r="http://schemas.openxmlformats.org/officeDocument/2006/relationships" xmlns:p="http://schemas.openxmlformats.org/presentationml/2006/main" type="title" preserve="1" showMasterSp="0">
+<p:sldLayout xmlns:a="http://schemas.openxmlformats.org/drawingml/2006/main" xmlns:r="http://schemas.openxmlformats.org/officeDocument/2006/relationships" xmlns:p="http://schemas.openxmlformats.org/presentationml/2006/main" showMasterSp="0" type="title" preserve="1">
   <p:cSld name="标题幻灯片">
     <p:spTree>
       <p:nvGrpSpPr>
@@ -1264,6 +1290,7 @@
           <a:p>
             <a:fld id="{B61BEF0D-F0BB-DE4B-95CE-6DB70DBA9567}" type="datetimeFigureOut">
               <a:rPr lang="en-US" smtClean="0"/>
+              <a:t>9/28/2018</a:t>
             </a:fld>
             <a:endParaRPr lang="en-US" dirty="0"/>
           </a:p>
@@ -1305,6 +1332,7 @@
           <a:p>
             <a:fld id="{D57F1E4F-1CFF-5643-939E-217C01CDF565}" type="slidenum">
               <a:rPr lang="en-US" smtClean="0"/>
+              <a:t>‹#›</a:t>
             </a:fld>
             <a:endParaRPr lang="en-US" dirty="0"/>
           </a:p>
@@ -1488,7 +1516,6 @@
               <a:rPr lang="zh-CN" altLang="en-US" smtClean="0"/>
               <a:t>单击此处编辑母版文本样式</a:t>
             </a:r>
-            <a:endParaRPr lang="zh-CN" altLang="en-US" smtClean="0"/>
           </a:p>
         </p:txBody>
       </p:sp>
@@ -1509,6 +1536,7 @@
           <a:p>
             <a:fld id="{B61BEF0D-F0BB-DE4B-95CE-6DB70DBA9567}" type="datetimeFigureOut">
               <a:rPr lang="en-US" smtClean="0"/>
+              <a:t>9/28/2018</a:t>
             </a:fld>
             <a:endParaRPr lang="en-US" dirty="0"/>
           </a:p>
@@ -1550,6 +1578,7 @@
           <a:p>
             <a:fld id="{D57F1E4F-1CFF-5643-939E-217C01CDF565}" type="slidenum">
               <a:rPr lang="en-US" smtClean="0"/>
+              <a:t>‹#›</a:t>
             </a:fld>
             <a:endParaRPr lang="en-US" dirty="0"/>
           </a:p>
@@ -1674,7 +1703,6 @@
               <a:rPr lang="zh-CN" altLang="en-US" smtClean="0"/>
               <a:t>单击此处编辑母版文本样式</a:t>
             </a:r>
-            <a:endParaRPr lang="zh-CN" altLang="en-US" smtClean="0"/>
           </a:p>
         </p:txBody>
       </p:sp>
@@ -1797,7 +1825,6 @@
               <a:rPr lang="zh-CN" altLang="en-US" smtClean="0"/>
               <a:t>单击此处编辑母版文本样式</a:t>
             </a:r>
-            <a:endParaRPr lang="zh-CN" altLang="en-US" smtClean="0"/>
           </a:p>
         </p:txBody>
       </p:sp>
@@ -1818,6 +1845,7 @@
           <a:p>
             <a:fld id="{B61BEF0D-F0BB-DE4B-95CE-6DB70DBA9567}" type="datetimeFigureOut">
               <a:rPr lang="en-US" smtClean="0"/>
+              <a:t>9/28/2018</a:t>
             </a:fld>
             <a:endParaRPr lang="en-US" dirty="0"/>
           </a:p>
@@ -1859,6 +1887,7 @@
           <a:p>
             <a:fld id="{D57F1E4F-1CFF-5643-939E-217C01CDF565}" type="slidenum">
               <a:rPr lang="en-US" smtClean="0"/>
+              <a:t>‹#›</a:t>
             </a:fld>
             <a:endParaRPr lang="en-US" dirty="0"/>
           </a:p>
@@ -1902,19 +1931,6 @@
               </a:rPr>
               <a:t>“</a:t>
             </a:r>
-            <a:endParaRPr lang="en-US" sz="8000" baseline="0" dirty="0">
-              <a:ln w="3175" cmpd="sng">
-                <a:noFill/>
-              </a:ln>
-              <a:solidFill>
-                <a:schemeClr val="accent1">
-                  <a:lumMod val="60000"/>
-                  <a:lumOff val="40000"/>
-                </a:schemeClr>
-              </a:solidFill>
-              <a:effectLst/>
-              <a:latin typeface="Arial" panose="020B0604020202020204"/>
-            </a:endParaRPr>
           </a:p>
         </p:txBody>
       </p:sp>
@@ -1956,19 +1972,6 @@
               </a:rPr>
               <a:t>”</a:t>
             </a:r>
-            <a:endParaRPr lang="en-US" sz="8000" baseline="0" dirty="0">
-              <a:ln w="3175" cmpd="sng">
-                <a:noFill/>
-              </a:ln>
-              <a:solidFill>
-                <a:schemeClr val="accent1">
-                  <a:lumMod val="60000"/>
-                  <a:lumOff val="40000"/>
-                </a:schemeClr>
-              </a:solidFill>
-              <a:effectLst/>
-              <a:latin typeface="Arial" panose="020B0604020202020204"/>
-            </a:endParaRPr>
           </a:p>
         </p:txBody>
       </p:sp>
@@ -2150,7 +2153,6 @@
               <a:rPr lang="zh-CN" altLang="en-US" smtClean="0"/>
               <a:t>单击此处编辑母版文本样式</a:t>
             </a:r>
-            <a:endParaRPr lang="zh-CN" altLang="en-US" smtClean="0"/>
           </a:p>
         </p:txBody>
       </p:sp>
@@ -2171,6 +2173,7 @@
           <a:p>
             <a:fld id="{B61BEF0D-F0BB-DE4B-95CE-6DB70DBA9567}" type="datetimeFigureOut">
               <a:rPr lang="en-US" smtClean="0"/>
+              <a:t>9/28/2018</a:t>
             </a:fld>
             <a:endParaRPr lang="en-US" dirty="0"/>
           </a:p>
@@ -2212,6 +2215,7 @@
           <a:p>
             <a:fld id="{D57F1E4F-1CFF-5643-939E-217C01CDF565}" type="slidenum">
               <a:rPr lang="en-US" smtClean="0"/>
+              <a:t>‹#›</a:t>
             </a:fld>
             <a:endParaRPr lang="en-US" dirty="0"/>
           </a:p>
@@ -2336,7 +2340,6 @@
               <a:rPr lang="zh-CN" altLang="en-US" smtClean="0"/>
               <a:t>单击此处编辑母版文本样式</a:t>
             </a:r>
-            <a:endParaRPr lang="zh-CN" altLang="en-US" smtClean="0"/>
           </a:p>
         </p:txBody>
       </p:sp>
@@ -2459,7 +2462,6 @@
               <a:rPr lang="zh-CN" altLang="en-US" smtClean="0"/>
               <a:t>单击此处编辑母版文本样式</a:t>
             </a:r>
-            <a:endParaRPr lang="zh-CN" altLang="en-US" smtClean="0"/>
           </a:p>
         </p:txBody>
       </p:sp>
@@ -2480,6 +2482,7 @@
           <a:p>
             <a:fld id="{B61BEF0D-F0BB-DE4B-95CE-6DB70DBA9567}" type="datetimeFigureOut">
               <a:rPr lang="en-US" smtClean="0"/>
+              <a:t>9/28/2018</a:t>
             </a:fld>
             <a:endParaRPr lang="en-US" dirty="0"/>
           </a:p>
@@ -2521,6 +2524,7 @@
           <a:p>
             <a:fld id="{D57F1E4F-1CFF-5643-939E-217C01CDF565}" type="slidenum">
               <a:rPr lang="en-US" smtClean="0"/>
+              <a:t>‹#›</a:t>
             </a:fld>
             <a:endParaRPr lang="en-US" dirty="0"/>
           </a:p>
@@ -2564,19 +2568,6 @@
               </a:rPr>
               <a:t>“</a:t>
             </a:r>
-            <a:endParaRPr lang="en-US" sz="8000" baseline="0" dirty="0">
-              <a:ln w="3175" cmpd="sng">
-                <a:noFill/>
-              </a:ln>
-              <a:solidFill>
-                <a:schemeClr val="accent1">
-                  <a:lumMod val="60000"/>
-                  <a:lumOff val="40000"/>
-                </a:schemeClr>
-              </a:solidFill>
-              <a:effectLst/>
-              <a:latin typeface="Arial" panose="020B0604020202020204"/>
-            </a:endParaRPr>
           </a:p>
         </p:txBody>
       </p:sp>
@@ -2618,19 +2609,6 @@
               </a:rPr>
               <a:t>”</a:t>
             </a:r>
-            <a:endParaRPr lang="en-US" sz="8000" baseline="0" dirty="0">
-              <a:ln w="3175" cmpd="sng">
-                <a:noFill/>
-              </a:ln>
-              <a:solidFill>
-                <a:schemeClr val="accent1">
-                  <a:lumMod val="60000"/>
-                  <a:lumOff val="40000"/>
-                </a:schemeClr>
-              </a:solidFill>
-              <a:effectLst/>
-              <a:latin typeface="Arial" panose="020B0604020202020204"/>
-            </a:endParaRPr>
           </a:p>
         </p:txBody>
       </p:sp>
@@ -2750,7 +2728,6 @@
               <a:rPr lang="zh-CN" altLang="en-US" smtClean="0"/>
               <a:t>单击此处编辑母版文本样式</a:t>
             </a:r>
-            <a:endParaRPr lang="zh-CN" altLang="en-US" smtClean="0"/>
           </a:p>
         </p:txBody>
       </p:sp>
@@ -2873,7 +2850,6 @@
               <a:rPr lang="zh-CN" altLang="en-US" smtClean="0"/>
               <a:t>单击此处编辑母版文本样式</a:t>
             </a:r>
-            <a:endParaRPr lang="zh-CN" altLang="en-US" smtClean="0"/>
           </a:p>
         </p:txBody>
       </p:sp>
@@ -2894,6 +2870,7 @@
           <a:p>
             <a:fld id="{B61BEF0D-F0BB-DE4B-95CE-6DB70DBA9567}" type="datetimeFigureOut">
               <a:rPr lang="en-US" smtClean="0"/>
+              <a:t>9/28/2018</a:t>
             </a:fld>
             <a:endParaRPr lang="en-US" dirty="0"/>
           </a:p>
@@ -2935,6 +2912,7 @@
           <a:p>
             <a:fld id="{D57F1E4F-1CFF-5643-939E-217C01CDF565}" type="slidenum">
               <a:rPr lang="en-US" smtClean="0"/>
+              <a:t>‹#›</a:t>
             </a:fld>
             <a:endParaRPr lang="en-US" dirty="0"/>
           </a:p>
@@ -3008,7 +2986,6 @@
               <a:rPr lang="zh-CN" altLang="en-US" smtClean="0"/>
               <a:t>单击此处编辑母版文本样式</a:t>
             </a:r>
-            <a:endParaRPr lang="zh-CN" altLang="en-US" smtClean="0"/>
           </a:p>
           <a:p>
             <a:pPr lvl="1"/>
@@ -3016,7 +2993,6 @@
               <a:rPr lang="zh-CN" altLang="en-US" smtClean="0"/>
               <a:t>第二级</a:t>
             </a:r>
-            <a:endParaRPr lang="zh-CN" altLang="en-US" smtClean="0"/>
           </a:p>
           <a:p>
             <a:pPr lvl="2"/>
@@ -3024,7 +3000,6 @@
               <a:rPr lang="zh-CN" altLang="en-US" smtClean="0"/>
               <a:t>第三级</a:t>
             </a:r>
-            <a:endParaRPr lang="zh-CN" altLang="en-US" smtClean="0"/>
           </a:p>
           <a:p>
             <a:pPr lvl="3"/>
@@ -3032,7 +3007,6 @@
               <a:rPr lang="zh-CN" altLang="en-US" smtClean="0"/>
               <a:t>第四级</a:t>
             </a:r>
-            <a:endParaRPr lang="zh-CN" altLang="en-US" smtClean="0"/>
           </a:p>
           <a:p>
             <a:pPr lvl="4"/>
@@ -3061,6 +3035,7 @@
           <a:p>
             <a:fld id="{B61BEF0D-F0BB-DE4B-95CE-6DB70DBA9567}" type="datetimeFigureOut">
               <a:rPr lang="en-US" smtClean="0"/>
+              <a:t>9/28/2018</a:t>
             </a:fld>
             <a:endParaRPr lang="en-US" dirty="0"/>
           </a:p>
@@ -3102,6 +3077,7 @@
           <a:p>
             <a:fld id="{D57F1E4F-1CFF-5643-939E-217C01CDF565}" type="slidenum">
               <a:rPr lang="en-US" smtClean="0"/>
+              <a:t>‹#›</a:t>
             </a:fld>
             <a:endParaRPr lang="en-US" dirty="0"/>
           </a:p>
@@ -3185,7 +3161,6 @@
               <a:rPr lang="zh-CN" altLang="en-US" smtClean="0"/>
               <a:t>单击此处编辑母版文本样式</a:t>
             </a:r>
-            <a:endParaRPr lang="zh-CN" altLang="en-US" smtClean="0"/>
           </a:p>
           <a:p>
             <a:pPr lvl="1"/>
@@ -3193,7 +3168,6 @@
               <a:rPr lang="zh-CN" altLang="en-US" smtClean="0"/>
               <a:t>第二级</a:t>
             </a:r>
-            <a:endParaRPr lang="zh-CN" altLang="en-US" smtClean="0"/>
           </a:p>
           <a:p>
             <a:pPr lvl="2"/>
@@ -3201,7 +3175,6 @@
               <a:rPr lang="zh-CN" altLang="en-US" smtClean="0"/>
               <a:t>第三级</a:t>
             </a:r>
-            <a:endParaRPr lang="zh-CN" altLang="en-US" smtClean="0"/>
           </a:p>
           <a:p>
             <a:pPr lvl="3"/>
@@ -3209,7 +3182,6 @@
               <a:rPr lang="zh-CN" altLang="en-US" smtClean="0"/>
               <a:t>第四级</a:t>
             </a:r>
-            <a:endParaRPr lang="zh-CN" altLang="en-US" smtClean="0"/>
           </a:p>
           <a:p>
             <a:pPr lvl="4"/>
@@ -3238,6 +3210,7 @@
           <a:p>
             <a:fld id="{B61BEF0D-F0BB-DE4B-95CE-6DB70DBA9567}" type="datetimeFigureOut">
               <a:rPr lang="en-US" smtClean="0"/>
+              <a:t>9/28/2018</a:t>
             </a:fld>
             <a:endParaRPr lang="en-US" dirty="0"/>
           </a:p>
@@ -3279,6 +3252,7 @@
           <a:p>
             <a:fld id="{D57F1E4F-1CFF-5643-939E-217C01CDF565}" type="slidenum">
               <a:rPr lang="en-US" smtClean="0"/>
+              <a:t>‹#›</a:t>
             </a:fld>
             <a:endParaRPr lang="en-US" dirty="0"/>
           </a:p>
@@ -3352,7 +3326,6 @@
               <a:rPr lang="zh-CN" altLang="en-US" smtClean="0"/>
               <a:t>单击此处编辑母版文本样式</a:t>
             </a:r>
-            <a:endParaRPr lang="zh-CN" altLang="en-US" smtClean="0"/>
           </a:p>
           <a:p>
             <a:pPr lvl="1"/>
@@ -3360,7 +3333,6 @@
               <a:rPr lang="zh-CN" altLang="en-US" smtClean="0"/>
               <a:t>第二级</a:t>
             </a:r>
-            <a:endParaRPr lang="zh-CN" altLang="en-US" smtClean="0"/>
           </a:p>
           <a:p>
             <a:pPr lvl="2"/>
@@ -3368,7 +3340,6 @@
               <a:rPr lang="zh-CN" altLang="en-US" smtClean="0"/>
               <a:t>第三级</a:t>
             </a:r>
-            <a:endParaRPr lang="zh-CN" altLang="en-US" smtClean="0"/>
           </a:p>
           <a:p>
             <a:pPr lvl="3"/>
@@ -3376,7 +3347,6 @@
               <a:rPr lang="zh-CN" altLang="en-US" smtClean="0"/>
               <a:t>第四级</a:t>
             </a:r>
-            <a:endParaRPr lang="zh-CN" altLang="en-US" smtClean="0"/>
           </a:p>
           <a:p>
             <a:pPr lvl="4"/>
@@ -3405,6 +3375,7 @@
           <a:p>
             <a:fld id="{B61BEF0D-F0BB-DE4B-95CE-6DB70DBA9567}" type="datetimeFigureOut">
               <a:rPr lang="en-US" smtClean="0"/>
+              <a:t>9/28/2018</a:t>
             </a:fld>
             <a:endParaRPr lang="en-US" dirty="0"/>
           </a:p>
@@ -3446,6 +3417,7 @@
           <a:p>
             <a:fld id="{D57F1E4F-1CFF-5643-939E-217C01CDF565}" type="slidenum">
               <a:rPr lang="en-US" smtClean="0"/>
+              <a:t>‹#›</a:t>
             </a:fld>
             <a:endParaRPr lang="en-US" dirty="0"/>
           </a:p>
@@ -3625,7 +3597,6 @@
               <a:rPr lang="zh-CN" altLang="en-US" smtClean="0"/>
               <a:t>单击此处编辑母版文本样式</a:t>
             </a:r>
-            <a:endParaRPr lang="zh-CN" altLang="en-US" smtClean="0"/>
           </a:p>
         </p:txBody>
       </p:sp>
@@ -3646,6 +3617,7 @@
           <a:p>
             <a:fld id="{B61BEF0D-F0BB-DE4B-95CE-6DB70DBA9567}" type="datetimeFigureOut">
               <a:rPr lang="en-US" smtClean="0"/>
+              <a:t>9/28/2018</a:t>
             </a:fld>
             <a:endParaRPr lang="en-US" dirty="0"/>
           </a:p>
@@ -3687,6 +3659,7 @@
           <a:p>
             <a:fld id="{D57F1E4F-1CFF-5643-939E-217C01CDF565}" type="slidenum">
               <a:rPr lang="en-US" smtClean="0"/>
+              <a:t>‹#›</a:t>
             </a:fld>
             <a:endParaRPr lang="en-US" dirty="0"/>
           </a:p>
@@ -3765,7 +3738,6 @@
               <a:rPr lang="zh-CN" altLang="en-US" smtClean="0"/>
               <a:t>单击此处编辑母版文本样式</a:t>
             </a:r>
-            <a:endParaRPr lang="zh-CN" altLang="en-US" smtClean="0"/>
           </a:p>
           <a:p>
             <a:pPr lvl="1"/>
@@ -3773,7 +3745,6 @@
               <a:rPr lang="zh-CN" altLang="en-US" smtClean="0"/>
               <a:t>第二级</a:t>
             </a:r>
-            <a:endParaRPr lang="zh-CN" altLang="en-US" smtClean="0"/>
           </a:p>
           <a:p>
             <a:pPr lvl="2"/>
@@ -3781,7 +3752,6 @@
               <a:rPr lang="zh-CN" altLang="en-US" smtClean="0"/>
               <a:t>第三级</a:t>
             </a:r>
-            <a:endParaRPr lang="zh-CN" altLang="en-US" smtClean="0"/>
           </a:p>
           <a:p>
             <a:pPr lvl="3"/>
@@ -3789,7 +3759,6 @@
               <a:rPr lang="zh-CN" altLang="en-US" smtClean="0"/>
               <a:t>第四级</a:t>
             </a:r>
-            <a:endParaRPr lang="zh-CN" altLang="en-US" smtClean="0"/>
           </a:p>
           <a:p>
             <a:pPr lvl="4"/>
@@ -3826,7 +3795,6 @@
               <a:rPr lang="zh-CN" altLang="en-US" smtClean="0"/>
               <a:t>单击此处编辑母版文本样式</a:t>
             </a:r>
-            <a:endParaRPr lang="zh-CN" altLang="en-US" smtClean="0"/>
           </a:p>
           <a:p>
             <a:pPr lvl="1"/>
@@ -3834,7 +3802,6 @@
               <a:rPr lang="zh-CN" altLang="en-US" smtClean="0"/>
               <a:t>第二级</a:t>
             </a:r>
-            <a:endParaRPr lang="zh-CN" altLang="en-US" smtClean="0"/>
           </a:p>
           <a:p>
             <a:pPr lvl="2"/>
@@ -3842,7 +3809,6 @@
               <a:rPr lang="zh-CN" altLang="en-US" smtClean="0"/>
               <a:t>第三级</a:t>
             </a:r>
-            <a:endParaRPr lang="zh-CN" altLang="en-US" smtClean="0"/>
           </a:p>
           <a:p>
             <a:pPr lvl="3"/>
@@ -3850,7 +3816,6 @@
               <a:rPr lang="zh-CN" altLang="en-US" smtClean="0"/>
               <a:t>第四级</a:t>
             </a:r>
-            <a:endParaRPr lang="zh-CN" altLang="en-US" smtClean="0"/>
           </a:p>
           <a:p>
             <a:pPr lvl="4"/>
@@ -3879,6 +3844,7 @@
           <a:p>
             <a:fld id="{B61BEF0D-F0BB-DE4B-95CE-6DB70DBA9567}" type="datetimeFigureOut">
               <a:rPr lang="en-US" smtClean="0"/>
+              <a:t>9/28/2018</a:t>
             </a:fld>
             <a:endParaRPr lang="en-US" dirty="0"/>
           </a:p>
@@ -3920,6 +3886,7 @@
           <a:p>
             <a:fld id="{D57F1E4F-1CFF-5643-939E-217C01CDF565}" type="slidenum">
               <a:rPr lang="en-US" smtClean="0"/>
+              <a:t>‹#›</a:t>
             </a:fld>
             <a:endParaRPr lang="en-US" dirty="0"/>
           </a:p>
@@ -4041,7 +4008,6 @@
               <a:rPr lang="zh-CN" altLang="en-US" smtClean="0"/>
               <a:t>单击此处编辑母版文本样式</a:t>
             </a:r>
-            <a:endParaRPr lang="zh-CN" altLang="en-US" smtClean="0"/>
           </a:p>
         </p:txBody>
       </p:sp>
@@ -4072,7 +4038,6 @@
               <a:rPr lang="zh-CN" altLang="en-US" smtClean="0"/>
               <a:t>单击此处编辑母版文本样式</a:t>
             </a:r>
-            <a:endParaRPr lang="zh-CN" altLang="en-US" smtClean="0"/>
           </a:p>
           <a:p>
             <a:pPr lvl="1"/>
@@ -4080,7 +4045,6 @@
               <a:rPr lang="zh-CN" altLang="en-US" smtClean="0"/>
               <a:t>第二级</a:t>
             </a:r>
-            <a:endParaRPr lang="zh-CN" altLang="en-US" smtClean="0"/>
           </a:p>
           <a:p>
             <a:pPr lvl="2"/>
@@ -4088,7 +4052,6 @@
               <a:rPr lang="zh-CN" altLang="en-US" smtClean="0"/>
               <a:t>第三级</a:t>
             </a:r>
-            <a:endParaRPr lang="zh-CN" altLang="en-US" smtClean="0"/>
           </a:p>
           <a:p>
             <a:pPr lvl="3"/>
@@ -4096,7 +4059,6 @@
               <a:rPr lang="zh-CN" altLang="en-US" smtClean="0"/>
               <a:t>第四级</a:t>
             </a:r>
-            <a:endParaRPr lang="zh-CN" altLang="en-US" smtClean="0"/>
           </a:p>
           <a:p>
             <a:pPr lvl="4"/>
@@ -4172,7 +4134,6 @@
               <a:rPr lang="zh-CN" altLang="en-US" smtClean="0"/>
               <a:t>单击此处编辑母版文本样式</a:t>
             </a:r>
-            <a:endParaRPr lang="zh-CN" altLang="en-US" smtClean="0"/>
           </a:p>
         </p:txBody>
       </p:sp>
@@ -4203,7 +4164,6 @@
               <a:rPr lang="zh-CN" altLang="en-US" smtClean="0"/>
               <a:t>单击此处编辑母版文本样式</a:t>
             </a:r>
-            <a:endParaRPr lang="zh-CN" altLang="en-US" smtClean="0"/>
           </a:p>
           <a:p>
             <a:pPr lvl="1"/>
@@ -4211,7 +4171,6 @@
               <a:rPr lang="zh-CN" altLang="en-US" smtClean="0"/>
               <a:t>第二级</a:t>
             </a:r>
-            <a:endParaRPr lang="zh-CN" altLang="en-US" smtClean="0"/>
           </a:p>
           <a:p>
             <a:pPr lvl="2"/>
@@ -4219,7 +4178,6 @@
               <a:rPr lang="zh-CN" altLang="en-US" smtClean="0"/>
               <a:t>第三级</a:t>
             </a:r>
-            <a:endParaRPr lang="zh-CN" altLang="en-US" smtClean="0"/>
           </a:p>
           <a:p>
             <a:pPr lvl="3"/>
@@ -4227,7 +4185,6 @@
               <a:rPr lang="zh-CN" altLang="en-US" smtClean="0"/>
               <a:t>第四级</a:t>
             </a:r>
-            <a:endParaRPr lang="zh-CN" altLang="en-US" smtClean="0"/>
           </a:p>
           <a:p>
             <a:pPr lvl="4"/>
@@ -4256,6 +4213,7 @@
           <a:p>
             <a:fld id="{B61BEF0D-F0BB-DE4B-95CE-6DB70DBA9567}" type="datetimeFigureOut">
               <a:rPr lang="en-US" smtClean="0"/>
+              <a:t>9/28/2018</a:t>
             </a:fld>
             <a:endParaRPr lang="en-US" dirty="0"/>
           </a:p>
@@ -4297,6 +4255,7 @@
           <a:p>
             <a:fld id="{D57F1E4F-1CFF-5643-939E-217C01CDF565}" type="slidenum">
               <a:rPr lang="en-US" smtClean="0"/>
+              <a:t>‹#›</a:t>
             </a:fld>
             <a:endParaRPr lang="en-US" dirty="0"/>
           </a:p>
@@ -4372,6 +4331,7 @@
           <a:p>
             <a:fld id="{B61BEF0D-F0BB-DE4B-95CE-6DB70DBA9567}" type="datetimeFigureOut">
               <a:rPr lang="en-US" smtClean="0"/>
+              <a:t>9/28/2018</a:t>
             </a:fld>
             <a:endParaRPr lang="en-US" dirty="0"/>
           </a:p>
@@ -4413,6 +4373,7 @@
           <a:p>
             <a:fld id="{D57F1E4F-1CFF-5643-939E-217C01CDF565}" type="slidenum">
               <a:rPr lang="en-US" smtClean="0"/>
+              <a:t>‹#›</a:t>
             </a:fld>
             <a:endParaRPr lang="en-US" dirty="0"/>
           </a:p>
@@ -4460,6 +4421,7 @@
           <a:p>
             <a:fld id="{B61BEF0D-F0BB-DE4B-95CE-6DB70DBA9567}" type="datetimeFigureOut">
               <a:rPr lang="en-US" smtClean="0"/>
+              <a:t>9/28/2018</a:t>
             </a:fld>
             <a:endParaRPr lang="en-US" dirty="0"/>
           </a:p>
@@ -4501,6 +4463,7 @@
           <a:p>
             <a:fld id="{D57F1E4F-1CFF-5643-939E-217C01CDF565}" type="slidenum">
               <a:rPr lang="en-US" smtClean="0"/>
+              <a:t>‹#›</a:t>
             </a:fld>
             <a:endParaRPr lang="en-US" dirty="0"/>
           </a:p>
@@ -4592,7 +4555,6 @@
               <a:rPr lang="zh-CN" altLang="en-US" smtClean="0"/>
               <a:t>单击此处编辑母版文本样式</a:t>
             </a:r>
-            <a:endParaRPr lang="zh-CN" altLang="en-US" smtClean="0"/>
           </a:p>
           <a:p>
             <a:pPr lvl="1"/>
@@ -4600,7 +4562,6 @@
               <a:rPr lang="zh-CN" altLang="en-US" smtClean="0"/>
               <a:t>第二级</a:t>
             </a:r>
-            <a:endParaRPr lang="zh-CN" altLang="en-US" smtClean="0"/>
           </a:p>
           <a:p>
             <a:pPr lvl="2"/>
@@ -4608,7 +4569,6 @@
               <a:rPr lang="zh-CN" altLang="en-US" smtClean="0"/>
               <a:t>第三级</a:t>
             </a:r>
-            <a:endParaRPr lang="zh-CN" altLang="en-US" smtClean="0"/>
           </a:p>
           <a:p>
             <a:pPr lvl="3"/>
@@ -4616,7 +4576,6 @@
               <a:rPr lang="zh-CN" altLang="en-US" smtClean="0"/>
               <a:t>第四级</a:t>
             </a:r>
-            <a:endParaRPr lang="zh-CN" altLang="en-US" smtClean="0"/>
           </a:p>
           <a:p>
             <a:pPr lvl="4"/>
@@ -4692,7 +4651,6 @@
               <a:rPr lang="zh-CN" altLang="en-US" smtClean="0"/>
               <a:t>单击此处编辑母版文本样式</a:t>
             </a:r>
-            <a:endParaRPr lang="zh-CN" altLang="en-US" smtClean="0"/>
           </a:p>
         </p:txBody>
       </p:sp>
@@ -4713,6 +4671,7 @@
           <a:p>
             <a:fld id="{B61BEF0D-F0BB-DE4B-95CE-6DB70DBA9567}" type="datetimeFigureOut">
               <a:rPr lang="en-US" smtClean="0"/>
+              <a:t>9/28/2018</a:t>
             </a:fld>
             <a:endParaRPr lang="en-US" dirty="0"/>
           </a:p>
@@ -4754,6 +4713,7 @@
           <a:p>
             <a:fld id="{D57F1E4F-1CFF-5643-939E-217C01CDF565}" type="slidenum">
               <a:rPr lang="en-US" smtClean="0"/>
+              <a:t>‹#›</a:t>
             </a:fld>
             <a:endParaRPr lang="en-US" dirty="0"/>
           </a:p>
@@ -4949,7 +4909,6 @@
               <a:rPr lang="zh-CN" altLang="en-US" smtClean="0"/>
               <a:t>单击此处编辑母版文本样式</a:t>
             </a:r>
-            <a:endParaRPr lang="zh-CN" altLang="en-US" smtClean="0"/>
           </a:p>
         </p:txBody>
       </p:sp>
@@ -4989,6 +4948,7 @@
           <a:p>
             <a:fld id="{D57F1E4F-1CFF-5643-939E-217C01CDF565}" type="slidenum">
               <a:rPr lang="en-US" smtClean="0"/>
+              <a:t>‹#›</a:t>
             </a:fld>
             <a:endParaRPr lang="en-US" dirty="0"/>
           </a:p>
@@ -5011,6 +4971,7 @@
           <a:p>
             <a:fld id="{B61BEF0D-F0BB-DE4B-95CE-6DB70DBA9567}" type="datetimeFigureOut">
               <a:rPr lang="en-US" smtClean="0"/>
+              <a:t>9/28/2018</a:t>
             </a:fld>
             <a:endParaRPr lang="en-US" dirty="0"/>
           </a:p>
@@ -5640,7 +5601,6 @@
               <a:rPr lang="zh-CN" altLang="en-US" smtClean="0"/>
               <a:t>单击此处编辑母版文本样式</a:t>
             </a:r>
-            <a:endParaRPr lang="zh-CN" altLang="en-US" smtClean="0"/>
           </a:p>
           <a:p>
             <a:pPr lvl="1"/>
@@ -5648,7 +5608,6 @@
               <a:rPr lang="zh-CN" altLang="en-US" smtClean="0"/>
               <a:t>第二级</a:t>
             </a:r>
-            <a:endParaRPr lang="zh-CN" altLang="en-US" smtClean="0"/>
           </a:p>
           <a:p>
             <a:pPr lvl="2"/>
@@ -5656,7 +5615,6 @@
               <a:rPr lang="zh-CN" altLang="en-US" smtClean="0"/>
               <a:t>第三级</a:t>
             </a:r>
-            <a:endParaRPr lang="zh-CN" altLang="en-US" smtClean="0"/>
           </a:p>
           <a:p>
             <a:pPr lvl="3"/>
@@ -5664,7 +5622,6 @@
               <a:rPr lang="zh-CN" altLang="en-US" smtClean="0"/>
               <a:t>第四级</a:t>
             </a:r>
-            <a:endParaRPr lang="zh-CN" altLang="en-US" smtClean="0"/>
           </a:p>
           <a:p>
             <a:pPr lvl="4"/>
@@ -5711,6 +5668,7 @@
           <a:p>
             <a:fld id="{B61BEF0D-F0BB-DE4B-95CE-6DB70DBA9567}" type="datetimeFigureOut">
               <a:rPr lang="en-US" smtClean="0"/>
+              <a:t>9/28/2018</a:t>
             </a:fld>
             <a:endParaRPr lang="en-US" dirty="0"/>
           </a:p>
@@ -5786,6 +5744,7 @@
           <a:p>
             <a:fld id="{D57F1E4F-1CFF-5643-939E-217C01CDF565}" type="slidenum">
               <a:rPr lang="en-US" smtClean="0"/>
+              <a:t>‹#›</a:t>
             </a:fld>
             <a:endParaRPr lang="en-US" dirty="0"/>
           </a:p>
@@ -6375,7 +6334,7 @@
           <p:nvPr/>
         </p:nvPicPr>
         <p:blipFill>
-          <a:blip r:embed="rId1">
+          <a:blip r:embed="rId2">
             <a:extLst>
               <a:ext uri="{28A0092B-C50C-407E-A947-70E740481C1C}">
                 <a14:useLocalDpi xmlns:a14="http://schemas.microsoft.com/office/drawing/2010/main" val="0"/>
@@ -6543,7 +6502,7 @@
           <p:nvPr/>
         </p:nvPicPr>
         <p:blipFill>
-          <a:blip r:embed="rId1"/>
+          <a:blip r:embed="rId2"/>
           <a:stretch>
             <a:fillRect/>
           </a:stretch>
@@ -6565,7 +6524,7 @@
           <p:nvPr/>
         </p:nvPicPr>
         <p:blipFill>
-          <a:blip r:embed="rId2"/>
+          <a:blip r:embed="rId3"/>
           <a:stretch>
             <a:fillRect/>
           </a:stretch>
@@ -6688,7 +6647,7 @@
           <p:nvPr/>
         </p:nvPicPr>
         <p:blipFill>
-          <a:blip r:embed="rId1"/>
+          <a:blip r:embed="rId2"/>
           <a:stretch>
             <a:fillRect/>
           </a:stretch>
@@ -6712,7 +6671,7 @@
           <p:nvPr/>
         </p:nvPicPr>
         <p:blipFill>
-          <a:blip r:embed="rId2"/>
+          <a:blip r:embed="rId3"/>
           <a:stretch>
             <a:fillRect/>
           </a:stretch>
@@ -6732,11 +6691,11 @@
   <p:clrMapOvr>
     <a:masterClrMapping/>
   </p:clrMapOvr>
-  <mc:AlternateContent xmlns:mc="http://schemas.openxmlformats.org/markup-compatibility/2006">
-    <mc:Choice xmlns:p14="http://schemas.microsoft.com/office/powerpoint/2010/main" Requires="p14">
+  <mc:AlternateContent xmlns:mc="http://schemas.openxmlformats.org/markup-compatibility/2006" xmlns:p14="http://schemas.microsoft.com/office/powerpoint/2010/main">
+    <mc:Choice Requires="p14">
       <p:transition spd="slow" p14:dur="2000" advTm="8373"/>
     </mc:Choice>
-    <mc:Fallback>
+    <mc:Fallback xmlns="">
       <p:transition spd="slow" advTm="8373"/>
     </mc:Fallback>
   </mc:AlternateContent>
@@ -6923,7 +6882,6 @@
               <a:rPr lang="en-US" altLang="zh-CN" dirty="0" smtClean="0"/>
               <a:t>3</a:t>
             </a:r>
-            <a:endParaRPr lang="en-US" altLang="zh-CN" dirty="0" smtClean="0"/>
           </a:p>
         </p:txBody>
       </p:sp>
@@ -6968,7 +6926,7 @@
           <p:nvPr/>
         </p:nvPicPr>
         <p:blipFill>
-          <a:blip r:embed="rId1"/>
+          <a:blip r:embed="rId2"/>
           <a:stretch>
             <a:fillRect/>
           </a:stretch>
@@ -7042,7 +7000,6 @@
               <a:rPr lang="en-US" altLang="zh-CN" dirty="0" smtClean="0"/>
               <a:t>4</a:t>
             </a:r>
-            <a:endParaRPr lang="en-US" altLang="zh-CN" dirty="0" smtClean="0"/>
           </a:p>
         </p:txBody>
       </p:sp>
@@ -7104,6 +7061,7 @@
           <a:bodyPr wrap="none" rtlCol="0">
             <a:spAutoFit/>
           </a:bodyPr>
+          <a:lstStyle/>
           <a:p>
             <a:r>
               <a:rPr lang="zh-CN" altLang="en-US"/>
@@ -7137,9 +7095,6 @@
               </a:rPr>
               <a:t>anr</a:t>
             </a:r>
-            <a:endParaRPr lang="en-US" altLang="zh-CN">
-              <a:ea typeface="宋体" panose="02010600030101010101" pitchFamily="2" charset="-122"/>
-            </a:endParaRPr>
           </a:p>
         </p:txBody>
       </p:sp>
@@ -7152,7 +7107,7 @@
           <p:nvPr/>
         </p:nvPicPr>
         <p:blipFill>
-          <a:blip r:embed="rId1"/>
+          <a:blip r:embed="rId2"/>
           <a:stretch>
             <a:fillRect/>
           </a:stretch>
@@ -7333,9 +7288,6 @@
                         </a:rPr>
                         <a:t>当前的事件没有机会得到处理</a:t>
                       </a:r>
-                      <a:endParaRPr lang="zh-CN" sz="1050" kern="100" dirty="0">
-                        <a:effectLst/>
-                      </a:endParaRPr>
                     </a:p>
                     <a:p>
                       <a:pPr algn="l">
@@ -7630,7 +7582,6 @@
               <a:rPr lang="zh-CN" altLang="zh-CN" sz="1200" dirty="0"/>
               <a:t>将耗时操作放在子线程中执行！！！</a:t>
             </a:r>
-            <a:endParaRPr lang="zh-CN" altLang="zh-CN" sz="1200" dirty="0"/>
           </a:p>
         </p:txBody>
       </p:sp>
@@ -8084,7 +8035,6 @@
               <a:rPr lang="zh-CN" altLang="en-US" dirty="0"/>
               <a:t>。</a:t>
             </a:r>
-            <a:endParaRPr lang="zh-CN" altLang="en-US" dirty="0"/>
           </a:p>
           <a:p>
             <a:endParaRPr lang="zh-CN" altLang="en-US" dirty="0"/>
@@ -8158,6 +8108,10 @@
               <a:rPr lang="zh-CN" altLang="en-US" dirty="0"/>
               <a:t>线程</a:t>
             </a:r>
+            <a:r>
+              <a:rPr lang="en-US" altLang="zh-CN" dirty="0"/>
+              <a:t/>
+            </a:r>
             <a:br>
               <a:rPr lang="en-US" altLang="zh-CN" dirty="0"/>
             </a:br>
@@ -8282,7 +8236,6 @@
               <a:rPr lang="en-US" altLang="zh-CN" dirty="0" smtClean="0"/>
               <a:t>)</a:t>
             </a:r>
-            <a:endParaRPr lang="en-US" altLang="zh-CN" dirty="0" smtClean="0"/>
           </a:p>
           <a:p>
             <a:r>
@@ -8705,9 +8658,6 @@
               </a:rPr>
               <a:t>小结</a:t>
             </a:r>
-            <a:endParaRPr lang="zh-CN" dirty="0">
-              <a:ea typeface="宋体" panose="02010600030101010101" pitchFamily="2" charset="-122"/>
-            </a:endParaRPr>
           </a:p>
         </p:txBody>
       </p:sp>
@@ -8734,58 +8684,100 @@
           <a:lstStyle/>
           <a:p>
             <a:r>
-              <a:rPr lang="en-US"/>
+              <a:rPr lang="en-US" dirty="0"/>
               <a:t>ANR</a:t>
             </a:r>
             <a:r>
-              <a:t>: 主线程在特定的时间内没有完成特定的事情。</a:t>
-            </a:r>
-          </a:p>
-          <a:p>
-            <a:r>
-              <a:rPr lang="zh-CN">
-                <a:ea typeface="宋体" panose="02010600030101010101" pitchFamily="2" charset="-122"/>
+              <a:rPr dirty="0"/>
+              <a:t>: </a:t>
+            </a:r>
+            <a:r>
+              <a:rPr dirty="0" err="1"/>
+              <a:t>主线程在特定的时间内没有完成特定的事情</a:t>
+            </a:r>
+            <a:r>
+              <a:rPr dirty="0" smtClean="0"/>
+              <a:t>。</a:t>
+            </a:r>
+            <a:endParaRPr lang="en-US" dirty="0" smtClean="0"/>
+          </a:p>
+          <a:p>
+            <a:r>
+              <a:rPr lang="zh-CN" dirty="0" smtClean="0"/>
+              <a:t>原理</a:t>
+            </a:r>
+            <a:r>
+              <a:rPr lang="zh-CN" dirty="0"/>
+              <a:t>：超时弹</a:t>
+            </a:r>
+            <a:r>
+              <a:rPr lang="zh-CN" dirty="0"/>
+              <a:t>窗</a:t>
+            </a:r>
+            <a:r>
+              <a:rPr lang="en-US" altLang="zh-CN" dirty="0"/>
+              <a:t>,</a:t>
+            </a:r>
+            <a:r>
+              <a:rPr lang="zh-CN" altLang="zh-CN" dirty="0"/>
+              <a:t> traces.</a:t>
+            </a:r>
+            <a:r>
+              <a:rPr lang="zh-CN" altLang="zh-CN" dirty="0" smtClean="0"/>
+              <a:t>txt</a:t>
+            </a:r>
+            <a:r>
+              <a:rPr lang="zh-CN" altLang="en-US" dirty="0"/>
+              <a:t>分析</a:t>
+            </a:r>
+            <a:r>
+              <a:rPr lang="zh-CN" altLang="zh-CN" dirty="0" smtClean="0">
+                <a:sym typeface="+mn-ea"/>
               </a:rPr>
-              <a:t>原理：超时弹窗</a:t>
-            </a:r>
+              <a:t>局限性</a:t>
+            </a:r>
+            <a:endParaRPr lang="zh-CN" dirty="0"/>
           </a:p>
           <a:p>
             <a:r>
               <a:rPr lang="zh-CN" altLang="zh-CN" dirty="0">
                 <a:sym typeface="+mn-ea"/>
               </a:rPr>
-              <a:t>预防为主，养成好的编码习惯，将耗时操作放在子线程中执行</a:t>
-            </a:r>
-            <a:endParaRPr lang="zh-CN" altLang="zh-CN" dirty="0">
-              <a:sym typeface="+mn-ea"/>
-            </a:endParaRPr>
-          </a:p>
-          <a:p>
-            <a:r>
-              <a:rPr lang="zh-CN" altLang="zh-CN" b="1" dirty="0" smtClean="0">
-                <a:latin typeface="Calibri" panose="020F0502020204030204" pitchFamily="34" charset="0"/>
-                <a:ea typeface="宋体" panose="02010600030101010101" pitchFamily="2" charset="-122"/>
-                <a:cs typeface="Times New Roman" panose="02020603050405020304" pitchFamily="18" charset="0"/>
+              <a:t>预防为主</a:t>
+            </a:r>
+            <a:r>
+              <a:rPr lang="zh-CN" altLang="zh-CN" dirty="0" smtClean="0">
+                <a:sym typeface="+mn-ea"/>
               </a:rPr>
-              <a:t>traces.txt</a:t>
+              <a:t>，</a:t>
+            </a:r>
+            <a:r>
+              <a:rPr lang="zh-CN" altLang="en-US" dirty="0" smtClean="0">
+                <a:sym typeface="+mn-ea"/>
+              </a:rPr>
+              <a:t>分清哪些是主线程</a:t>
+            </a:r>
+            <a:r>
+              <a:rPr lang="zh-CN" altLang="zh-CN" dirty="0" smtClean="0">
+                <a:sym typeface="+mn-ea"/>
+              </a:rPr>
+              <a:t>，</a:t>
             </a:r>
             <a:r>
               <a:rPr lang="zh-CN" altLang="zh-CN" dirty="0">
                 <a:sym typeface="+mn-ea"/>
               </a:rPr>
-              <a:t>局限性</a:t>
-            </a:r>
-            <a:endParaRPr lang="zh-CN" altLang="zh-CN" b="1" dirty="0" smtClean="0">
-              <a:latin typeface="Calibri" panose="020F0502020204030204" pitchFamily="34" charset="0"/>
-              <a:ea typeface="宋体" panose="02010600030101010101" pitchFamily="2" charset="-122"/>
-              <a:cs typeface="Times New Roman" panose="02020603050405020304" pitchFamily="18" charset="0"/>
+              <a:t>将耗时操作放在子线程中</a:t>
+            </a:r>
+            <a:r>
+              <a:rPr lang="zh-CN" altLang="zh-CN" dirty="0" smtClean="0">
+                <a:sym typeface="+mn-ea"/>
+              </a:rPr>
+              <a:t>执行</a:t>
+            </a:r>
+            <a:endParaRPr lang="en-US" altLang="zh-CN" dirty="0" smtClean="0">
+              <a:sym typeface="+mn-ea"/>
             </a:endParaRPr>
-          </a:p>
-          <a:p>
-            <a:pPr marL="0" indent="0">
-              <a:buNone/>
-            </a:pPr>
-            <a:endParaRPr lang="en-US" altLang="zh-CN" dirty="0" smtClean="0"/>
           </a:p>
         </p:txBody>
       </p:sp>
@@ -8831,36 +8823,185 @@
             <p:ph type="title"/>
           </p:nvPr>
         </p:nvSpPr>
+        <p:spPr/>
+        <p:txBody>
+          <a:bodyPr/>
+          <a:lstStyle/>
+          <a:p>
+            <a:r>
+              <a:rPr lang="en-US" altLang="zh-CN" dirty="0"/>
+              <a:t>ANR</a:t>
+            </a:r>
+            <a:r>
+              <a:rPr lang="zh-CN" dirty="0">
+                <a:ea typeface="宋体" panose="02010600030101010101" pitchFamily="2" charset="-122"/>
+              </a:rPr>
+              <a:t>小结</a:t>
+            </a:r>
+          </a:p>
+        </p:txBody>
+      </p:sp>
+      <p:sp>
+        <p:nvSpPr>
+          <p:cNvPr id="9" name="Content Placeholder 2"/>
+          <p:cNvSpPr>
+            <a:spLocks noGrp="1"/>
+          </p:cNvSpPr>
+          <p:nvPr>
+            <p:ph idx="1"/>
+          </p:nvPr>
+        </p:nvSpPr>
         <p:spPr>
           <a:xfrm>
-            <a:off x="677334" y="2592636"/>
-            <a:ext cx="8596668" cy="1320800"/>
+            <a:off x="677545" y="1633855"/>
+            <a:ext cx="8596630" cy="2674620"/>
           </a:xfrm>
         </p:spPr>
         <p:txBody>
           <a:bodyPr>
-            <a:noAutofit/>
+            <a:normAutofit/>
           </a:bodyPr>
           <a:lstStyle/>
           <a:p>
-            <a:pPr algn="ctr"/>
-            <a:r>
-              <a:rPr lang="en-US" altLang="zh-CN" sz="9600" dirty="0" smtClean="0">
-                <a:latin typeface="Apple Color Emoji" charset="0"/>
-                <a:ea typeface="Apple Color Emoji" charset="0"/>
-                <a:cs typeface="Apple Color Emoji" charset="0"/>
+            <a:r>
+              <a:rPr lang="en-US" dirty="0"/>
+              <a:t>ANR</a:t>
+            </a:r>
+            <a:r>
+              <a:rPr dirty="0"/>
+              <a:t>: </a:t>
+            </a:r>
+            <a:r>
+              <a:rPr dirty="0" err="1"/>
+              <a:t>主线程在特定的时间内没有完成特定的事情</a:t>
+            </a:r>
+            <a:r>
+              <a:rPr dirty="0" smtClean="0"/>
+              <a:t>。</a:t>
+            </a:r>
+            <a:endParaRPr lang="en-US" dirty="0" smtClean="0"/>
+          </a:p>
+          <a:p>
+            <a:r>
+              <a:rPr lang="zh-CN" dirty="0" smtClean="0"/>
+              <a:t>原理</a:t>
+            </a:r>
+            <a:r>
+              <a:rPr lang="zh-CN" dirty="0"/>
+              <a:t>：超时弹</a:t>
+            </a:r>
+            <a:r>
+              <a:rPr lang="zh-CN" dirty="0"/>
+              <a:t>窗</a:t>
+            </a:r>
+            <a:r>
+              <a:rPr lang="en-US" altLang="zh-CN" dirty="0"/>
+              <a:t>,</a:t>
+            </a:r>
+            <a:r>
+              <a:rPr lang="zh-CN" altLang="zh-CN" dirty="0"/>
+              <a:t> traces.</a:t>
+            </a:r>
+            <a:r>
+              <a:rPr lang="zh-CN" altLang="zh-CN" dirty="0" smtClean="0"/>
+              <a:t>txt</a:t>
+            </a:r>
+            <a:r>
+              <a:rPr lang="zh-CN" altLang="en-US" dirty="0"/>
+              <a:t>分析</a:t>
+            </a:r>
+            <a:r>
+              <a:rPr lang="zh-CN" altLang="zh-CN" dirty="0" smtClean="0">
+                <a:sym typeface="+mn-ea"/>
               </a:rPr>
-              <a:t>Q&amp;A</a:t>
-            </a:r>
-            <a:endParaRPr lang="en-US" sz="9600" dirty="0">
-              <a:latin typeface="Apple Color Emoji" charset="0"/>
-              <a:ea typeface="Apple Color Emoji" charset="0"/>
-              <a:cs typeface="Apple Color Emoji" charset="0"/>
+              <a:t>局限性</a:t>
+            </a:r>
+            <a:endParaRPr lang="zh-CN" dirty="0"/>
+          </a:p>
+          <a:p>
+            <a:r>
+              <a:rPr lang="zh-CN" altLang="zh-CN" dirty="0">
+                <a:sym typeface="+mn-ea"/>
+              </a:rPr>
+              <a:t>预防为主</a:t>
+            </a:r>
+            <a:r>
+              <a:rPr lang="zh-CN" altLang="zh-CN" dirty="0" smtClean="0">
+                <a:sym typeface="+mn-ea"/>
+              </a:rPr>
+              <a:t>，</a:t>
+            </a:r>
+            <a:r>
+              <a:rPr lang="zh-CN" altLang="en-US" dirty="0" smtClean="0">
+                <a:sym typeface="+mn-ea"/>
+              </a:rPr>
+              <a:t>分清哪些是主线程</a:t>
+            </a:r>
+            <a:r>
+              <a:rPr lang="zh-CN" altLang="zh-CN" dirty="0" smtClean="0">
+                <a:sym typeface="+mn-ea"/>
+              </a:rPr>
+              <a:t>，</a:t>
+            </a:r>
+            <a:r>
+              <a:rPr lang="zh-CN" altLang="zh-CN" dirty="0">
+                <a:sym typeface="+mn-ea"/>
+              </a:rPr>
+              <a:t>将耗时操作放在子线程中</a:t>
+            </a:r>
+            <a:r>
+              <a:rPr lang="zh-CN" altLang="zh-CN" dirty="0" smtClean="0">
+                <a:sym typeface="+mn-ea"/>
+              </a:rPr>
+              <a:t>执行</a:t>
+            </a:r>
+            <a:endParaRPr lang="en-US" altLang="zh-CN" dirty="0" smtClean="0">
+              <a:sym typeface="+mn-ea"/>
             </a:endParaRPr>
           </a:p>
+          <a:p>
+            <a:r>
+              <a:rPr lang="zh-CN" altLang="en-US" dirty="0" smtClean="0">
+                <a:sym typeface="+mn-ea"/>
+              </a:rPr>
+              <a:t>资料</a:t>
+            </a:r>
+            <a:r>
+              <a:rPr lang="en-US" altLang="zh-CN" dirty="0">
+                <a:sym typeface="+mn-ea"/>
+              </a:rPr>
+              <a:t>:</a:t>
+            </a:r>
+            <a:r>
+              <a:rPr lang="en-US" altLang="zh-CN" dirty="0" smtClean="0">
+                <a:sym typeface="+mn-ea"/>
+              </a:rPr>
+              <a:t>android-7.1.1_r1.7z-https</a:t>
+            </a:r>
+            <a:r>
+              <a:rPr lang="en-US" altLang="zh-CN" dirty="0">
+                <a:sym typeface="+mn-ea"/>
+              </a:rPr>
+              <a:t>://fs.djicorp.com/f/ebca324ece/</a:t>
+            </a:r>
+            <a:endParaRPr lang="zh-CN" altLang="zh-CN" dirty="0">
+              <a:sym typeface="+mn-ea"/>
+            </a:endParaRPr>
+          </a:p>
+          <a:p>
+            <a:pPr marL="0" indent="0">
+              <a:buNone/>
+            </a:pPr>
+            <a:endParaRPr lang="en-US" altLang="zh-CN" dirty="0" smtClean="0"/>
+          </a:p>
         </p:txBody>
       </p:sp>
     </p:spTree>
+    <p:extLst>
+      <p:ext uri="{BB962C8B-B14F-4D97-AF65-F5344CB8AC3E}">
+        <p14:creationId xmlns:p14="http://schemas.microsoft.com/office/powerpoint/2010/main" val="1745070855"/>
+      </p:ext>
+    </p:extLst>
   </p:cSld>
   <p:clrMapOvr>
     <a:masterClrMapping/>
@@ -8966,7 +9107,6 @@
               <a:rPr lang="en-US" altLang="zh-CN" dirty="0" smtClean="0"/>
               <a:t>ServiceTimeout:20s,200s</a:t>
             </a:r>
-            <a:endParaRPr lang="en-US" altLang="zh-CN" dirty="0" smtClean="0"/>
           </a:p>
           <a:p>
             <a:r>
@@ -8981,7 +9121,6 @@
               <a:rPr lang="en-US" altLang="zh-CN" dirty="0" smtClean="0"/>
               <a:t>10s,60s</a:t>
             </a:r>
-            <a:endParaRPr lang="en-US" altLang="zh-CN" dirty="0" smtClean="0"/>
           </a:p>
           <a:p>
             <a:r>
@@ -9007,7 +9146,7 @@
           <p:nvPr/>
         </p:nvPicPr>
         <p:blipFill>
-          <a:blip r:embed="rId1">
+          <a:blip r:embed="rId3">
             <a:extLst>
               <a:ext uri="{28A0092B-C50C-407E-A947-70E740481C1C}">
                 <a14:useLocalDpi xmlns:a14="http://schemas.microsoft.com/office/drawing/2010/main" val="0"/>
@@ -9053,6 +9192,7 @@
           <a:bodyPr wrap="square" rtlCol="0">
             <a:spAutoFit/>
           </a:bodyPr>
+          <a:lstStyle/>
           <a:p>
             <a:pPr algn="l"/>
             <a:r>
@@ -9067,7 +9207,77 @@
               <a:rPr lang="zh-CN" altLang="en-US"/>
               <a:t>时间内没有完成特定的事情</a:t>
             </a:r>
-            <a:endParaRPr lang="zh-CN" altLang="en-US"/>
+          </a:p>
+        </p:txBody>
+      </p:sp>
+    </p:spTree>
+  </p:cSld>
+  <p:clrMapOvr>
+    <a:masterClrMapping/>
+  </p:clrMapOvr>
+  <p:timing>
+    <p:tnLst>
+      <p:par>
+        <p:cTn id="1" dur="indefinite" restart="never" nodeType="tmRoot"/>
+      </p:par>
+    </p:tnLst>
+  </p:timing>
+</p:sld>
+</file>
+
+<file path=ppt/slides/slide20.xml><?xml version="1.0" encoding="utf-8"?>
+<p:sld xmlns:a="http://schemas.openxmlformats.org/drawingml/2006/main" xmlns:r="http://schemas.openxmlformats.org/officeDocument/2006/relationships" xmlns:p="http://schemas.openxmlformats.org/presentationml/2006/main">
+  <p:cSld>
+    <p:spTree>
+      <p:nvGrpSpPr>
+        <p:cNvPr id="1" name=""/>
+        <p:cNvGrpSpPr/>
+        <p:nvPr/>
+      </p:nvGrpSpPr>
+      <p:grpSpPr>
+        <a:xfrm>
+          <a:off x="0" y="0"/>
+          <a:ext cx="0" cy="0"/>
+          <a:chOff x="0" y="0"/>
+          <a:chExt cx="0" cy="0"/>
+        </a:xfrm>
+      </p:grpSpPr>
+      <p:sp>
+        <p:nvSpPr>
+          <p:cNvPr id="2" name="Title 1"/>
+          <p:cNvSpPr>
+            <a:spLocks noGrp="1"/>
+          </p:cNvSpPr>
+          <p:nvPr>
+            <p:ph type="title"/>
+          </p:nvPr>
+        </p:nvSpPr>
+        <p:spPr>
+          <a:xfrm>
+            <a:off x="677334" y="2592636"/>
+            <a:ext cx="8596668" cy="1320800"/>
+          </a:xfrm>
+        </p:spPr>
+        <p:txBody>
+          <a:bodyPr>
+            <a:noAutofit/>
+          </a:bodyPr>
+          <a:lstStyle/>
+          <a:p>
+            <a:pPr algn="ctr"/>
+            <a:r>
+              <a:rPr lang="en-US" altLang="zh-CN" sz="9600" dirty="0" smtClean="0">
+                <a:latin typeface="Apple Color Emoji" charset="0"/>
+                <a:ea typeface="Apple Color Emoji" charset="0"/>
+                <a:cs typeface="Apple Color Emoji" charset="0"/>
+              </a:rPr>
+              <a:t>Q&amp;A</a:t>
+            </a:r>
+            <a:endParaRPr lang="en-US" sz="9600" dirty="0">
+              <a:latin typeface="Apple Color Emoji" charset="0"/>
+              <a:ea typeface="Apple Color Emoji" charset="0"/>
+              <a:cs typeface="Apple Color Emoji" charset="0"/>
+            </a:endParaRPr>
           </a:p>
         </p:txBody>
       </p:sp>
@@ -9201,14 +9411,6 @@
               </a:rPr>
               <a:t>从EventHub取出事件并处理，再交给InputDispatcher；</a:t>
             </a:r>
-            <a:endParaRPr altLang="zh-CN" dirty="0">
-              <a:solidFill>
-                <a:schemeClr val="tx1">
-                  <a:lumMod val="75000"/>
-                  <a:lumOff val="25000"/>
-                </a:schemeClr>
-              </a:solidFill>
-            </a:endParaRPr>
           </a:p>
           <a:p>
             <a:pPr algn="l"/>
@@ -9246,14 +9448,6 @@
               </a:rPr>
               <a:t>接收来自InputReader的输入事件，派发事件；</a:t>
             </a:r>
-            <a:endParaRPr altLang="zh-CN" dirty="0">
-              <a:solidFill>
-                <a:schemeClr val="tx1">
-                  <a:lumMod val="75000"/>
-                  <a:lumOff val="25000"/>
-                </a:schemeClr>
-              </a:solidFill>
-            </a:endParaRPr>
           </a:p>
           <a:p>
             <a:pPr algn="l"/>
@@ -9291,14 +9485,6 @@
               </a:rPr>
               <a:t>跟WMS交互，派发事件到ViewRootImpl；</a:t>
             </a:r>
-            <a:endParaRPr altLang="zh-CN" dirty="0">
-              <a:solidFill>
-                <a:schemeClr val="tx1">
-                  <a:lumMod val="75000"/>
-                  <a:lumOff val="25000"/>
-                </a:schemeClr>
-              </a:solidFill>
-            </a:endParaRPr>
           </a:p>
         </p:txBody>
       </p:sp>
@@ -9585,7 +9771,7 @@
           <p:nvPr/>
         </p:nvPicPr>
         <p:blipFill>
-          <a:blip r:embed="rId1"/>
+          <a:blip r:embed="rId2"/>
           <a:stretch>
             <a:fillRect/>
           </a:stretch>
@@ -9958,7 +10144,7 @@
           <p:nvPr/>
         </p:nvPicPr>
         <p:blipFill>
-          <a:blip r:embed="rId1"/>
+          <a:blip r:embed="rId2"/>
           <a:stretch>
             <a:fillRect/>
           </a:stretch>
@@ -9982,7 +10168,7 @@
           <p:nvPr/>
         </p:nvPicPr>
         <p:blipFill>
-          <a:blip r:embed="rId2"/>
+          <a:blip r:embed="rId3"/>
           <a:stretch>
             <a:fillRect/>
           </a:stretch>
@@ -10355,7 +10541,7 @@
           <p:nvPr/>
         </p:nvPicPr>
         <p:blipFill>
-          <a:blip r:embed="rId1"/>
+          <a:blip r:embed="rId2"/>
           <a:stretch>
             <a:fillRect/>
           </a:stretch>
@@ -10506,7 +10692,6 @@
               <a:rPr lang="en-US" altLang="zh-CN" smtClean="0"/>
               <a:t>-Service Timeout</a:t>
             </a:r>
-            <a:endParaRPr lang="en-US" altLang="zh-CN" smtClean="0"/>
           </a:p>
         </p:txBody>
       </p:sp>
@@ -10517,7 +10702,7 @@
           <p:nvPr/>
         </p:nvPicPr>
         <p:blipFill>
-          <a:blip r:embed="rId1"/>
+          <a:blip r:embed="rId2"/>
           <a:stretch>
             <a:fillRect/>
           </a:stretch>
@@ -10539,7 +10724,7 @@
           <p:nvPr/>
         </p:nvPicPr>
         <p:blipFill>
-          <a:blip r:embed="rId2"/>
+          <a:blip r:embed="rId3"/>
           <a:stretch>
             <a:fillRect/>
           </a:stretch>
@@ -10619,9 +10804,6 @@
               </a:rPr>
               <a:t>上报</a:t>
             </a:r>
-            <a:endParaRPr lang="zh-CN" altLang="en-US" dirty="0" smtClean="0">
-              <a:ea typeface="宋体" panose="02010600030101010101" pitchFamily="2" charset="-122"/>
-            </a:endParaRPr>
           </a:p>
         </p:txBody>
       </p:sp>
@@ -10634,7 +10816,7 @@
           <p:nvPr/>
         </p:nvPicPr>
         <p:blipFill>
-          <a:blip r:embed="rId1"/>
+          <a:blip r:embed="rId2"/>
           <a:stretch>
             <a:fillRect/>
           </a:stretch>
@@ -10654,11 +10836,11 @@
   <p:clrMapOvr>
     <a:masterClrMapping/>
   </p:clrMapOvr>
-  <mc:AlternateContent xmlns:mc="http://schemas.openxmlformats.org/markup-compatibility/2006">
-    <mc:Choice xmlns:p14="http://schemas.microsoft.com/office/powerpoint/2010/main" Requires="p14">
+  <mc:AlternateContent xmlns:mc="http://schemas.openxmlformats.org/markup-compatibility/2006" xmlns:p14="http://schemas.microsoft.com/office/powerpoint/2010/main">
+    <mc:Choice Requires="p14">
       <p:transition spd="slow" p14:dur="2000" advTm="2678"/>
     </mc:Choice>
-    <mc:Fallback>
+    <mc:Fallback xmlns="">
       <p:transition spd="slow" advTm="2678"/>
     </mc:Fallback>
   </mc:AlternateContent>
@@ -10803,9 +10985,6 @@
               </a:rPr>
               <a:t>，时效性</a:t>
             </a:r>
-            <a:endParaRPr lang="zh-CN" altLang="en-US" dirty="0" smtClean="0">
-              <a:ea typeface="宋体" panose="02010600030101010101" pitchFamily="2" charset="-122"/>
-            </a:endParaRPr>
           </a:p>
         </p:txBody>
       </p:sp>
@@ -10818,7 +10997,7 @@
           <p:nvPr/>
         </p:nvPicPr>
         <p:blipFill>
-          <a:blip r:embed="rId1"/>
+          <a:blip r:embed="rId2"/>
           <a:stretch>
             <a:fillRect/>
           </a:stretch>
@@ -10842,7 +11021,7 @@
           <p:nvPr/>
         </p:nvPicPr>
         <p:blipFill>
-          <a:blip r:embed="rId2"/>
+          <a:blip r:embed="rId3"/>
           <a:stretch>
             <a:fillRect/>
           </a:stretch>
@@ -11056,9 +11235,6 @@
               </a:rPr>
               <a:t>分析工具</a:t>
             </a:r>
-            <a:endParaRPr lang="zh-CN" altLang="en-US" dirty="0">
-              <a:ea typeface="宋体" panose="02010600030101010101" pitchFamily="2" charset="-122"/>
-            </a:endParaRPr>
           </a:p>
         </p:txBody>
       </p:sp>
@@ -11119,7 +11295,7 @@
           <p:nvPr/>
         </p:nvPicPr>
         <p:blipFill>
-          <a:blip r:embed="rId1"/>
+          <a:blip r:embed="rId2"/>
           <a:stretch>
             <a:fillRect/>
           </a:stretch>
@@ -11143,7 +11319,7 @@
           <p:nvPr/>
         </p:nvPicPr>
         <p:blipFill>
-          <a:blip r:embed="rId2"/>
+          <a:blip r:embed="rId3"/>
           <a:stretch>
             <a:fillRect/>
           </a:stretch>
@@ -11549,6 +11725,8 @@
       </a:bgFillStyleLst>
     </a:fmtScheme>
   </a:themeElements>
+  <a:objectDefaults/>
+  <a:extraClrSchemeLst/>
   <a:extLst>
     <a:ext uri="{05A4C25C-085E-4340-85A3-A5531E510DB2}">
       <thm15:themeFamily xmlns:thm15="http://schemas.microsoft.com/office/thememl/2012/main" name="Office Theme" id="{62F939B6-93AF-4DB8-9C6B-D6C7DFDC589F}" vid="{4A3C46E8-61CC-4603-A589-7422A47A8E4A}"/>
@@ -11808,6 +11986,8 @@
       </a:bgFillStyleLst>
     </a:fmtScheme>
   </a:themeElements>
+  <a:objectDefaults/>
+  <a:extraClrSchemeLst/>
   <a:extLst>
     <a:ext uri="{05A4C25C-085E-4340-85A3-A5531E510DB2}">
       <thm15:themeFamily xmlns:thm15="http://schemas.microsoft.com/office/thememl/2012/main" name="Office Theme" id="{62F939B6-93AF-4DB8-9C6B-D6C7DFDC589F}" vid="{4A3C46E8-61CC-4603-A589-7422A47A8E4A}"/>

</xml_diff>